<commit_message>
Model WindNODE KWUM diagram update in ppt
</commit_message>
<xml_diff>
--- a/windnode_kwum/docs/Modell_KWUM.pptx
+++ b/windnode_kwum/docs/Modell_KWUM.pptx
@@ -194,7 +194,7 @@
           <a:p>
             <a:fld id="{FFAFB158-CE29-D640-AF46-24D22F3973B1}" type="datetimeFigureOut">
               <a:rPr lang="en-US" smtClean="0"/>
-              <a:t>8/19/18</a:t>
+              <a:t>9/12/18</a:t>
             </a:fld>
             <a:endParaRPr lang="en-US"/>
           </a:p>
@@ -727,7 +727,7 @@
           <a:p>
             <a:fld id="{26D4ED77-5BAD-4853-9D32-3E8CE03B9A25}" type="datetimeFigureOut">
               <a:rPr lang="de-DE" smtClean="0"/>
-              <a:t>8/19/18</a:t>
+              <a:t>9/12/18</a:t>
             </a:fld>
             <a:endParaRPr lang="de-DE"/>
           </a:p>
@@ -897,7 +897,7 @@
           <a:p>
             <a:fld id="{26D4ED77-5BAD-4853-9D32-3E8CE03B9A25}" type="datetimeFigureOut">
               <a:rPr lang="de-DE" smtClean="0"/>
-              <a:t>8/19/18</a:t>
+              <a:t>9/12/18</a:t>
             </a:fld>
             <a:endParaRPr lang="de-DE"/>
           </a:p>
@@ -1077,7 +1077,7 @@
           <a:p>
             <a:fld id="{26D4ED77-5BAD-4853-9D32-3E8CE03B9A25}" type="datetimeFigureOut">
               <a:rPr lang="de-DE" smtClean="0"/>
-              <a:t>8/19/18</a:t>
+              <a:t>9/12/18</a:t>
             </a:fld>
             <a:endParaRPr lang="de-DE"/>
           </a:p>
@@ -1247,7 +1247,7 @@
           <a:p>
             <a:fld id="{26D4ED77-5BAD-4853-9D32-3E8CE03B9A25}" type="datetimeFigureOut">
               <a:rPr lang="de-DE" smtClean="0"/>
-              <a:t>8/19/18</a:t>
+              <a:t>9/12/18</a:t>
             </a:fld>
             <a:endParaRPr lang="de-DE"/>
           </a:p>
@@ -1493,7 +1493,7 @@
           <a:p>
             <a:fld id="{26D4ED77-5BAD-4853-9D32-3E8CE03B9A25}" type="datetimeFigureOut">
               <a:rPr lang="de-DE" smtClean="0"/>
-              <a:t>8/19/18</a:t>
+              <a:t>9/12/18</a:t>
             </a:fld>
             <a:endParaRPr lang="de-DE"/>
           </a:p>
@@ -1781,7 +1781,7 @@
           <a:p>
             <a:fld id="{26D4ED77-5BAD-4853-9D32-3E8CE03B9A25}" type="datetimeFigureOut">
               <a:rPr lang="de-DE" smtClean="0"/>
-              <a:t>8/19/18</a:t>
+              <a:t>9/12/18</a:t>
             </a:fld>
             <a:endParaRPr lang="de-DE"/>
           </a:p>
@@ -2208,7 +2208,7 @@
           <a:p>
             <a:fld id="{26D4ED77-5BAD-4853-9D32-3E8CE03B9A25}" type="datetimeFigureOut">
               <a:rPr lang="de-DE" smtClean="0"/>
-              <a:t>8/19/18</a:t>
+              <a:t>9/12/18</a:t>
             </a:fld>
             <a:endParaRPr lang="de-DE"/>
           </a:p>
@@ -2326,7 +2326,7 @@
           <a:p>
             <a:fld id="{26D4ED77-5BAD-4853-9D32-3E8CE03B9A25}" type="datetimeFigureOut">
               <a:rPr lang="de-DE" smtClean="0"/>
-              <a:t>8/19/18</a:t>
+              <a:t>9/12/18</a:t>
             </a:fld>
             <a:endParaRPr lang="de-DE"/>
           </a:p>
@@ -2421,7 +2421,7 @@
           <a:p>
             <a:fld id="{26D4ED77-5BAD-4853-9D32-3E8CE03B9A25}" type="datetimeFigureOut">
               <a:rPr lang="de-DE" smtClean="0"/>
-              <a:t>8/19/18</a:t>
+              <a:t>9/12/18</a:t>
             </a:fld>
             <a:endParaRPr lang="de-DE"/>
           </a:p>
@@ -2698,7 +2698,7 @@
           <a:p>
             <a:fld id="{26D4ED77-5BAD-4853-9D32-3E8CE03B9A25}" type="datetimeFigureOut">
               <a:rPr lang="de-DE" smtClean="0"/>
-              <a:t>8/19/18</a:t>
+              <a:t>9/12/18</a:t>
             </a:fld>
             <a:endParaRPr lang="de-DE"/>
           </a:p>
@@ -2951,7 +2951,7 @@
           <a:p>
             <a:fld id="{26D4ED77-5BAD-4853-9D32-3E8CE03B9A25}" type="datetimeFigureOut">
               <a:rPr lang="de-DE" smtClean="0"/>
-              <a:t>8/19/18</a:t>
+              <a:t>9/12/18</a:t>
             </a:fld>
             <a:endParaRPr lang="de-DE"/>
           </a:p>
@@ -3164,7 +3164,7 @@
           <a:p>
             <a:fld id="{26D4ED77-5BAD-4853-9D32-3E8CE03B9A25}" type="datetimeFigureOut">
               <a:rPr lang="de-DE" smtClean="0"/>
-              <a:t>8/19/18</a:t>
+              <a:t>9/12/18</a:t>
             </a:fld>
             <a:endParaRPr lang="de-DE"/>
           </a:p>
@@ -3675,11 +3675,7 @@
               <a:pPr algn="ctr"/>
               <a:r>
                 <a:rPr lang="de-DE" sz="1400" dirty="0" err="1"/>
-                <a:t>b</a:t>
-              </a:r>
-              <a:r>
-                <a:rPr lang="de-DE" sz="1400" dirty="0" err="1"/>
-                <a:t>us_el</a:t>
+                <a:t>bus_el</a:t>
               </a:r>
               <a:endParaRPr lang="de-DE" sz="1400" dirty="0"/>
             </a:p>
@@ -3906,7 +3902,6 @@
                 <a:rPr lang="de-DE" sz="1400" dirty="0"/>
                 <a:t>P2H_pr</a:t>
               </a:r>
-              <a:endParaRPr lang="de-DE" sz="1400" dirty="0"/>
             </a:p>
           </p:txBody>
         </p:sp>
@@ -4077,7 +4072,9 @@
               <a:avLst/>
             </a:prstGeom>
             <a:solidFill>
-              <a:srgbClr val="FFC000"/>
+              <a:srgbClr val="FFC000">
+                <a:alpha val="35000"/>
+              </a:srgbClr>
             </a:solidFill>
             <a:ln>
               <a:noFill/>
@@ -4207,10 +4204,11 @@
             <a:prstGeom prst="straightConnector1">
               <a:avLst/>
             </a:prstGeom>
-            <a:ln w="19050">
+            <a:ln w="12700">
               <a:solidFill>
                 <a:schemeClr val="tx1"/>
               </a:solidFill>
+              <a:prstDash val="lgDash"/>
               <a:tailEnd type="arrow"/>
             </a:ln>
           </p:spPr>
@@ -4283,7 +4281,9 @@
               <a:avLst/>
             </a:prstGeom>
             <a:solidFill>
-              <a:schemeClr val="accent3"/>
+              <a:schemeClr val="accent3">
+                <a:alpha val="35000"/>
+              </a:schemeClr>
             </a:solidFill>
             <a:ln>
               <a:noFill/>
@@ -4614,7 +4614,9 @@
               <a:avLst/>
             </a:prstGeom>
             <a:solidFill>
-              <a:srgbClr val="FFC000"/>
+              <a:srgbClr val="FFC000">
+                <a:alpha val="35000"/>
+              </a:srgbClr>
             </a:solidFill>
             <a:ln>
               <a:noFill/>
@@ -4649,7 +4651,6 @@
                 <a:rPr lang="de-DE" sz="1400" dirty="0"/>
                 <a:t> </a:t>
               </a:r>
-              <a:endParaRPr lang="de-DE" sz="1400" dirty="0"/>
             </a:p>
           </p:txBody>
         </p:sp>
@@ -4708,10 +4709,11 @@
             <a:prstGeom prst="straightConnector1">
               <a:avLst/>
             </a:prstGeom>
-            <a:ln w="19050">
+            <a:ln w="12700">
               <a:solidFill>
                 <a:schemeClr val="tx1"/>
               </a:solidFill>
+              <a:prstDash val="lgDash"/>
               <a:tailEnd type="arrow"/>
             </a:ln>
           </p:spPr>
@@ -5057,8 +5059,8 @@
             <a:p>
               <a:pPr algn="ctr"/>
               <a:r>
-                <a:rPr lang="de-DE" sz="1400" dirty="0" err="1"/>
-                <a:t>Heat_chp_sch</a:t>
+                <a:rPr lang="de-DE" sz="1400" dirty="0" err="1" smtClean="0"/>
+                <a:t>chp_sch</a:t>
               </a:r>
               <a:endParaRPr lang="de-DE" sz="1400" dirty="0"/>
             </a:p>
@@ -5449,7 +5451,6 @@
                 <a:rPr lang="de-DE" sz="1400" dirty="0"/>
                 <a:t>P2H_sch</a:t>
               </a:r>
-              <a:endParaRPr lang="de-DE" sz="1400" dirty="0"/>
             </a:p>
           </p:txBody>
         </p:sp>
@@ -5468,7 +5469,9 @@
               <a:avLst/>
             </a:prstGeom>
             <a:solidFill>
-              <a:srgbClr val="FFC000"/>
+              <a:srgbClr val="FFC000">
+                <a:alpha val="40000"/>
+              </a:srgbClr>
             </a:solidFill>
             <a:ln>
               <a:noFill/>
@@ -5558,7 +5561,9 @@
               <a:avLst/>
             </a:prstGeom>
             <a:solidFill>
-              <a:schemeClr val="accent3"/>
+              <a:schemeClr val="accent3">
+                <a:alpha val="35000"/>
+              </a:schemeClr>
             </a:solidFill>
             <a:ln>
               <a:noFill/>
@@ -5610,10 +5615,11 @@
             <a:prstGeom prst="straightConnector1">
               <a:avLst/>
             </a:prstGeom>
-            <a:ln w="19050">
+            <a:ln w="12700">
               <a:solidFill>
                 <a:schemeClr val="tx1"/>
               </a:solidFill>
+              <a:prstDash val="lgDash"/>
               <a:tailEnd type="arrow"/>
             </a:ln>
           </p:spPr>
@@ -5647,7 +5653,9 @@
               <a:avLst/>
             </a:prstGeom>
             <a:solidFill>
-              <a:schemeClr val="accent3"/>
+              <a:schemeClr val="accent3">
+                <a:alpha val="35000"/>
+              </a:schemeClr>
             </a:solidFill>
             <a:ln>
               <a:noFill/>
@@ -5699,10 +5707,11 @@
             <a:prstGeom prst="straightConnector1">
               <a:avLst/>
             </a:prstGeom>
-            <a:ln w="19050">
+            <a:ln w="12700">
               <a:solidFill>
                 <a:schemeClr val="tx1"/>
               </a:solidFill>
+              <a:prstDash val="lgDash"/>
               <a:tailEnd type="arrow"/>
             </a:ln>
           </p:spPr>
@@ -5903,8 +5912,8 @@
             <a:p>
               <a:pPr algn="ctr"/>
               <a:r>
-                <a:rPr lang="de-DE" sz="1400" dirty="0" err="1"/>
-                <a:t>Heat_chp_pr</a:t>
+                <a:rPr lang="de-DE" sz="1400" dirty="0" err="1" smtClean="0"/>
+                <a:t>chp_pr</a:t>
               </a:r>
               <a:endParaRPr lang="de-DE" sz="1400" dirty="0"/>
             </a:p>
@@ -6216,6 +6225,7 @@
               <a:solidFill>
                 <a:schemeClr val="tx1"/>
               </a:solidFill>
+              <a:prstDash val="solid"/>
               <a:tailEnd type="arrow"/>
             </a:ln>
           </p:spPr>
@@ -6270,7 +6280,15 @@
               <a:pPr algn="ctr"/>
               <a:r>
                 <a:rPr lang="en-US" dirty="0" smtClean="0"/>
-                <a:t>20 AGO 2018</a:t>
+                <a:t>12 SEP</a:t>
+              </a:r>
+              <a:r>
+                <a:rPr lang="en-US" dirty="0" smtClean="0"/>
+                <a:t> </a:t>
+              </a:r>
+              <a:r>
+                <a:rPr lang="en-US" dirty="0" smtClean="0"/>
+                <a:t>2018</a:t>
               </a:r>
               <a:endParaRPr lang="en-US" dirty="0"/>
             </a:p>
@@ -6371,8 +6389,8 @@
             <a:p>
               <a:pPr algn="ctr"/>
               <a:r>
-                <a:rPr lang="de-DE" sz="1400" dirty="0" err="1"/>
-                <a:t>Cs_el</a:t>
+                <a:rPr lang="de-DE" sz="1400" dirty="0" err="1" smtClean="0"/>
+                <a:t>Cs_electric</a:t>
               </a:r>
               <a:endParaRPr lang="de-DE" sz="1400" dirty="0"/>
             </a:p>
@@ -6460,7 +6478,6 @@
                 <a:rPr lang="de-DE" sz="1400" dirty="0"/>
                 <a:t>P2H_spot</a:t>
               </a:r>
-              <a:endParaRPr lang="de-DE" sz="1400" dirty="0"/>
             </a:p>
           </p:txBody>
         </p:sp>
@@ -6551,7 +6568,7 @@
           <p:spPr>
             <a:xfrm>
               <a:off x="143509" y="492798"/>
-              <a:ext cx="2459690" cy="1280018"/>
+              <a:ext cx="2459690" cy="1839259"/>
             </a:xfrm>
             <a:prstGeom prst="rect">
               <a:avLst/>
@@ -6631,11 +6648,7 @@
               <a:pPr algn="ctr"/>
               <a:r>
                 <a:rPr lang="de-DE" sz="1400" dirty="0" err="1"/>
-                <a:t>t</a:t>
-              </a:r>
-              <a:r>
-                <a:rPr lang="de-DE" sz="1400" dirty="0" err="1"/>
-                <a:t>ransformer</a:t>
+                <a:t>transformer</a:t>
               </a:r>
               <a:endParaRPr lang="de-DE" sz="1400" dirty="0"/>
             </a:p>
@@ -6685,13 +6698,8 @@
               <a:pPr algn="ctr"/>
               <a:r>
                 <a:rPr lang="de-DE" sz="1400" dirty="0"/>
-                <a:t>s</a:t>
+                <a:t>sink</a:t>
               </a:r>
-              <a:r>
-                <a:rPr lang="de-DE" sz="1400" dirty="0"/>
-                <a:t>ink</a:t>
-              </a:r>
-              <a:endParaRPr lang="de-DE" sz="1400" dirty="0"/>
             </a:p>
           </p:txBody>
         </p:sp>
@@ -6739,11 +6747,7 @@
               <a:pPr algn="ctr"/>
               <a:r>
                 <a:rPr lang="de-DE" sz="1400" dirty="0" err="1"/>
-                <a:t>s</a:t>
-              </a:r>
-              <a:r>
-                <a:rPr lang="de-DE" sz="1400" dirty="0" err="1"/>
-                <a:t>ource</a:t>
+                <a:t>source</a:t>
               </a:r>
               <a:endParaRPr lang="de-DE" sz="1400" dirty="0"/>
             </a:p>
@@ -6923,7 +6927,6 @@
                 <a:rPr lang="de-DE" sz="1400" b="1" dirty="0"/>
                 <a:t>legend</a:t>
               </a:r>
-              <a:endParaRPr lang="de-DE" sz="1400" b="1" dirty="0"/>
             </a:p>
           </p:txBody>
         </p:sp>
@@ -6978,6 +6981,48 @@
               <a:latin typeface="Roboto Light" panose="02000000000000000000" pitchFamily="2" charset="0"/>
               <a:ea typeface="Roboto Light" panose="02000000000000000000" pitchFamily="2" charset="0"/>
               <a:cs typeface="Roboto Light" panose="02000000000000000000" pitchFamily="2" charset="0"/>
+            </a:endParaRPr>
+          </a:p>
+        </p:txBody>
+      </p:sp>
+      <p:sp>
+        <p:nvSpPr>
+          <p:cNvPr id="102" name="TextBox 101"/>
+          <p:cNvSpPr txBox="1"/>
+          <p:nvPr/>
+        </p:nvSpPr>
+        <p:spPr>
+          <a:xfrm>
+            <a:off x="352128" y="2784376"/>
+            <a:ext cx="2981118" cy="523220"/>
+          </a:xfrm>
+          <a:prstGeom prst="rect">
+            <a:avLst/>
+          </a:prstGeom>
+          <a:noFill/>
+        </p:spPr>
+        <p:txBody>
+          <a:bodyPr wrap="square" rtlCol="0">
+            <a:spAutoFit/>
+          </a:bodyPr>
+          <a:lstStyle/>
+          <a:p>
+            <a:r>
+              <a:rPr lang="en-US" sz="1400" dirty="0" smtClean="0">
+                <a:solidFill>
+                  <a:schemeClr val="bg1">
+                    <a:lumMod val="75000"/>
+                  </a:schemeClr>
+                </a:solidFill>
+              </a:rPr>
+              <a:t>Shortage and excess are used just for testing purposes</a:t>
+            </a:r>
+            <a:endParaRPr lang="en-US" sz="1400" dirty="0">
+              <a:solidFill>
+                <a:schemeClr val="bg1">
+                  <a:lumMod val="75000"/>
+                </a:schemeClr>
+              </a:solidFill>
             </a:endParaRPr>
           </a:p>
         </p:txBody>
@@ -7103,11 +7148,7 @@
             <a:p>
               <a:r>
                 <a:rPr lang="de-DE" sz="2000" dirty="0" err="1"/>
-                <a:t>b</a:t>
-              </a:r>
-              <a:r>
-                <a:rPr lang="de-DE" sz="2000" dirty="0" err="1"/>
-                <a:t>_el</a:t>
+                <a:t>b_el</a:t>
               </a:r>
               <a:endParaRPr lang="de-DE" sz="2000" dirty="0"/>
             </a:p>
@@ -7316,14 +7357,6 @@
               </a:rPr>
               <a:t>SENKE</a:t>
             </a:r>
-            <a:endParaRPr lang="de-DE" sz="1500" b="1" dirty="0">
-              <a:solidFill>
-                <a:schemeClr val="tx1"/>
-              </a:solidFill>
-              <a:latin typeface="Roboto Light" panose="02000000000000000000" pitchFamily="2" charset="0"/>
-              <a:ea typeface="Roboto Light" panose="02000000000000000000" pitchFamily="2" charset="0"/>
-              <a:cs typeface="Roboto Light" panose="02000000000000000000" pitchFamily="2" charset="0"/>
-            </a:endParaRPr>
           </a:p>
         </p:txBody>
       </p:sp>
@@ -7380,14 +7413,6 @@
               </a:rPr>
               <a:t>QUELLE</a:t>
             </a:r>
-            <a:endParaRPr lang="de-DE" sz="1400" b="1" dirty="0">
-              <a:solidFill>
-                <a:schemeClr val="tx1"/>
-              </a:solidFill>
-              <a:latin typeface="Roboto Light" panose="02000000000000000000" pitchFamily="2" charset="0"/>
-              <a:ea typeface="Roboto Light" panose="02000000000000000000" pitchFamily="2" charset="0"/>
-              <a:cs typeface="Roboto Light" panose="02000000000000000000" pitchFamily="2" charset="0"/>
-            </a:endParaRPr>
           </a:p>
         </p:txBody>
       </p:sp>
@@ -7444,14 +7469,6 @@
               </a:rPr>
               <a:t>QUELLE</a:t>
             </a:r>
-            <a:endParaRPr lang="de-DE" sz="1400" b="1" dirty="0">
-              <a:solidFill>
-                <a:schemeClr val="tx1"/>
-              </a:solidFill>
-              <a:latin typeface="Roboto Light" panose="02000000000000000000" pitchFamily="2" charset="0"/>
-              <a:ea typeface="Roboto Light" panose="02000000000000000000" pitchFamily="2" charset="0"/>
-              <a:cs typeface="Roboto Light" panose="02000000000000000000" pitchFamily="2" charset="0"/>
-            </a:endParaRPr>
           </a:p>
         </p:txBody>
       </p:sp>
@@ -7508,14 +7525,6 @@
               </a:rPr>
               <a:t>QUELLE</a:t>
             </a:r>
-            <a:endParaRPr lang="de-DE" sz="1400" b="1" dirty="0">
-              <a:solidFill>
-                <a:schemeClr val="tx1"/>
-              </a:solidFill>
-              <a:latin typeface="Roboto Light" panose="02000000000000000000" pitchFamily="2" charset="0"/>
-              <a:ea typeface="Roboto Light" panose="02000000000000000000" pitchFamily="2" charset="0"/>
-              <a:cs typeface="Roboto Light" panose="02000000000000000000" pitchFamily="2" charset="0"/>
-            </a:endParaRPr>
           </a:p>
         </p:txBody>
       </p:sp>
@@ -7572,14 +7581,6 @@
               </a:rPr>
               <a:t>TRAFO</a:t>
             </a:r>
-            <a:endParaRPr lang="de-DE" sz="1500" b="1" dirty="0">
-              <a:solidFill>
-                <a:schemeClr val="tx1"/>
-              </a:solidFill>
-              <a:latin typeface="Roboto Light" panose="02000000000000000000" pitchFamily="2" charset="0"/>
-              <a:ea typeface="Roboto Light" panose="02000000000000000000" pitchFamily="2" charset="0"/>
-              <a:cs typeface="Roboto Light" panose="02000000000000000000" pitchFamily="2" charset="0"/>
-            </a:endParaRPr>
           </a:p>
         </p:txBody>
       </p:sp>
@@ -7629,11 +7630,6 @@
               </a:rPr>
               <a:t>)</a:t>
             </a:r>
-            <a:endParaRPr lang="de-DE" sz="1400" dirty="0">
-              <a:latin typeface="Roboto Light" panose="02000000000000000000" pitchFamily="2" charset="0"/>
-              <a:ea typeface="Roboto Light" panose="02000000000000000000" pitchFamily="2" charset="0"/>
-              <a:cs typeface="Roboto Light" panose="02000000000000000000" pitchFamily="2" charset="0"/>
-            </a:endParaRPr>
           </a:p>
         </p:txBody>
       </p:sp>
@@ -7683,11 +7679,6 @@
               </a:rPr>
               <a:t>)</a:t>
             </a:r>
-            <a:endParaRPr lang="de-DE" sz="1400" dirty="0">
-              <a:latin typeface="Roboto Light" panose="02000000000000000000" pitchFamily="2" charset="0"/>
-              <a:ea typeface="Roboto Light" panose="02000000000000000000" pitchFamily="2" charset="0"/>
-              <a:cs typeface="Roboto Light" panose="02000000000000000000" pitchFamily="2" charset="0"/>
-            </a:endParaRPr>
           </a:p>
         </p:txBody>
       </p:sp>
@@ -7747,14 +7738,6 @@
               </a:rPr>
               <a:t>BAT</a:t>
             </a:r>
-            <a:endParaRPr lang="de-DE" sz="1500" b="1" dirty="0">
-              <a:solidFill>
-                <a:schemeClr val="tx1"/>
-              </a:solidFill>
-              <a:latin typeface="Roboto Light" panose="02000000000000000000" pitchFamily="2" charset="0"/>
-              <a:ea typeface="Roboto Light" panose="02000000000000000000" pitchFamily="2" charset="0"/>
-              <a:cs typeface="Roboto Light" panose="02000000000000000000" pitchFamily="2" charset="0"/>
-            </a:endParaRPr>
           </a:p>
         </p:txBody>
       </p:sp>
@@ -7964,14 +7947,6 @@
               </a:rPr>
               <a:t>WIND</a:t>
             </a:r>
-            <a:endParaRPr lang="de-DE" sz="1500" b="1" dirty="0">
-              <a:solidFill>
-                <a:schemeClr val="tx1"/>
-              </a:solidFill>
-              <a:latin typeface="Roboto Light" panose="02000000000000000000" pitchFamily="2" charset="0"/>
-              <a:ea typeface="Roboto Light" panose="02000000000000000000" pitchFamily="2" charset="0"/>
-              <a:cs typeface="Roboto Light" panose="02000000000000000000" pitchFamily="2" charset="0"/>
-            </a:endParaRPr>
           </a:p>
         </p:txBody>
       </p:sp>
@@ -8028,14 +8003,6 @@
               </a:rPr>
               <a:t>PV</a:t>
             </a:r>
-            <a:endParaRPr lang="de-DE" sz="1500" b="1" dirty="0">
-              <a:solidFill>
-                <a:schemeClr val="tx1"/>
-              </a:solidFill>
-              <a:latin typeface="Roboto Light" panose="02000000000000000000" pitchFamily="2" charset="0"/>
-              <a:ea typeface="Roboto Light" panose="02000000000000000000" pitchFamily="2" charset="0"/>
-              <a:cs typeface="Roboto Light" panose="02000000000000000000" pitchFamily="2" charset="0"/>
-            </a:endParaRPr>
           </a:p>
         </p:txBody>
       </p:sp>
@@ -8168,14 +8135,6 @@
               </a:rPr>
               <a:t>MARKT</a:t>
             </a:r>
-            <a:endParaRPr lang="de-DE" sz="1500" b="1" dirty="0">
-              <a:solidFill>
-                <a:schemeClr val="tx1"/>
-              </a:solidFill>
-              <a:latin typeface="Roboto Light" panose="02000000000000000000" pitchFamily="2" charset="0"/>
-              <a:ea typeface="Roboto Light" panose="02000000000000000000" pitchFamily="2" charset="0"/>
-              <a:cs typeface="Roboto Light" panose="02000000000000000000" pitchFamily="2" charset="0"/>
-            </a:endParaRPr>
           </a:p>
         </p:txBody>
       </p:sp>
@@ -8306,14 +8265,6 @@
               </a:rPr>
               <a:t>P2H</a:t>
             </a:r>
-            <a:endParaRPr lang="de-DE" sz="1500" b="1" dirty="0">
-              <a:solidFill>
-                <a:schemeClr val="tx1"/>
-              </a:solidFill>
-              <a:latin typeface="Roboto Light" panose="02000000000000000000" pitchFamily="2" charset="0"/>
-              <a:ea typeface="Roboto Light" panose="02000000000000000000" pitchFamily="2" charset="0"/>
-              <a:cs typeface="Roboto Light" panose="02000000000000000000" pitchFamily="2" charset="0"/>
-            </a:endParaRPr>
           </a:p>
         </p:txBody>
       </p:sp>
@@ -8444,14 +8395,6 @@
               </a:rPr>
               <a:t>WÄRMESENKE</a:t>
             </a:r>
-            <a:endParaRPr lang="de-DE" sz="1500" b="1" dirty="0">
-              <a:solidFill>
-                <a:schemeClr val="tx1"/>
-              </a:solidFill>
-              <a:latin typeface="Roboto Light" panose="02000000000000000000" pitchFamily="2" charset="0"/>
-              <a:ea typeface="Roboto Light" panose="02000000000000000000" pitchFamily="2" charset="0"/>
-              <a:cs typeface="Roboto Light" panose="02000000000000000000" pitchFamily="2" charset="0"/>
-            </a:endParaRPr>
           </a:p>
         </p:txBody>
       </p:sp>
@@ -8511,14 +8454,6 @@
               </a:rPr>
               <a:t>SPEICHER</a:t>
             </a:r>
-            <a:endParaRPr lang="de-DE" sz="1500" b="1" dirty="0">
-              <a:solidFill>
-                <a:schemeClr val="tx1"/>
-              </a:solidFill>
-              <a:latin typeface="Roboto Light" panose="02000000000000000000" pitchFamily="2" charset="0"/>
-              <a:ea typeface="Roboto Light" panose="02000000000000000000" pitchFamily="2" charset="0"/>
-              <a:cs typeface="Roboto Light" panose="02000000000000000000" pitchFamily="2" charset="0"/>
-            </a:endParaRPr>
           </a:p>
         </p:txBody>
       </p:sp>
@@ -8647,14 +8582,6 @@
               </a:rPr>
               <a:t>EXCESSSENKE</a:t>
             </a:r>
-            <a:endParaRPr lang="de-DE" sz="1500" b="1" dirty="0">
-              <a:solidFill>
-                <a:schemeClr val="tx1"/>
-              </a:solidFill>
-              <a:latin typeface="Roboto Light" panose="02000000000000000000" pitchFamily="2" charset="0"/>
-              <a:ea typeface="Roboto Light" panose="02000000000000000000" pitchFamily="2" charset="0"/>
-              <a:cs typeface="Roboto Light" panose="02000000000000000000" pitchFamily="2" charset="0"/>
-            </a:endParaRPr>
           </a:p>
         </p:txBody>
       </p:sp>
@@ -8732,14 +8659,6 @@
               </a:rPr>
               <a:t>KW</a:t>
             </a:r>
-            <a:endParaRPr lang="de-DE" sz="1400" b="1" dirty="0">
-              <a:solidFill>
-                <a:schemeClr val="tx1"/>
-              </a:solidFill>
-              <a:latin typeface="Roboto Light" panose="02000000000000000000" pitchFamily="2" charset="0"/>
-              <a:ea typeface="Roboto Light" panose="02000000000000000000" pitchFamily="2" charset="0"/>
-              <a:cs typeface="Roboto Light" panose="02000000000000000000" pitchFamily="2" charset="0"/>
-            </a:endParaRPr>
           </a:p>
         </p:txBody>
       </p:sp>
@@ -8822,7 +8741,6 @@
               <a:rPr lang="de-DE" sz="1100" dirty="0"/>
               <a:t>Abregelung über P_max</a:t>
             </a:r>
-            <a:endParaRPr lang="de-DE" sz="1100" dirty="0"/>
           </a:p>
         </p:txBody>
       </p:sp>
@@ -8879,14 +8797,6 @@
               </a:rPr>
               <a:t>P2G</a:t>
             </a:r>
-            <a:endParaRPr lang="de-DE" sz="1500" b="1" dirty="0">
-              <a:solidFill>
-                <a:schemeClr val="tx1"/>
-              </a:solidFill>
-              <a:latin typeface="Roboto Light" panose="02000000000000000000" pitchFamily="2" charset="0"/>
-              <a:ea typeface="Roboto Light" panose="02000000000000000000" pitchFamily="2" charset="0"/>
-              <a:cs typeface="Roboto Light" panose="02000000000000000000" pitchFamily="2" charset="0"/>
-            </a:endParaRPr>
           </a:p>
         </p:txBody>
       </p:sp>
@@ -9127,14 +9037,6 @@
               </a:rPr>
               <a:t>SENKE</a:t>
             </a:r>
-            <a:endParaRPr lang="de-DE" sz="1500" b="1" dirty="0">
-              <a:solidFill>
-                <a:schemeClr val="tx1"/>
-              </a:solidFill>
-              <a:latin typeface="Roboto Light" panose="02000000000000000000" pitchFamily="2" charset="0"/>
-              <a:ea typeface="Roboto Light" panose="02000000000000000000" pitchFamily="2" charset="0"/>
-              <a:cs typeface="Roboto Light" panose="02000000000000000000" pitchFamily="2" charset="0"/>
-            </a:endParaRPr>
           </a:p>
         </p:txBody>
       </p:sp>
@@ -9194,14 +9096,6 @@
               </a:rPr>
               <a:t>SPEICHER</a:t>
             </a:r>
-            <a:endParaRPr lang="de-DE" sz="1500" b="1" dirty="0">
-              <a:solidFill>
-                <a:schemeClr val="tx1"/>
-              </a:solidFill>
-              <a:latin typeface="Roboto Light" panose="02000000000000000000" pitchFamily="2" charset="0"/>
-              <a:ea typeface="Roboto Light" panose="02000000000000000000" pitchFamily="2" charset="0"/>
-              <a:cs typeface="Roboto Light" panose="02000000000000000000" pitchFamily="2" charset="0"/>
-            </a:endParaRPr>
           </a:p>
         </p:txBody>
       </p:sp>
@@ -9332,14 +9226,6 @@
               </a:rPr>
               <a:t>DSM</a:t>
             </a:r>
-            <a:endParaRPr lang="de-DE" sz="1500" b="1" dirty="0">
-              <a:solidFill>
-                <a:schemeClr val="tx1"/>
-              </a:solidFill>
-              <a:latin typeface="Roboto Light" panose="02000000000000000000" pitchFamily="2" charset="0"/>
-              <a:ea typeface="Roboto Light" panose="02000000000000000000" pitchFamily="2" charset="0"/>
-              <a:cs typeface="Roboto Light" panose="02000000000000000000" pitchFamily="2" charset="0"/>
-            </a:endParaRPr>
           </a:p>
         </p:txBody>
       </p:sp>
@@ -9417,14 +9303,6 @@
               </a:rPr>
               <a:t>LUSTE</a:t>
             </a:r>
-            <a:endParaRPr lang="de-DE" sz="1500" b="1" dirty="0">
-              <a:solidFill>
-                <a:schemeClr val="tx1"/>
-              </a:solidFill>
-              <a:latin typeface="Roboto Light" panose="02000000000000000000" pitchFamily="2" charset="0"/>
-              <a:ea typeface="Roboto Light" panose="02000000000000000000" pitchFamily="2" charset="0"/>
-              <a:cs typeface="Roboto Light" panose="02000000000000000000" pitchFamily="2" charset="0"/>
-            </a:endParaRPr>
           </a:p>
         </p:txBody>
       </p:sp>
@@ -9564,14 +9442,6 @@
               </a:rPr>
               <a:t>WIND</a:t>
             </a:r>
-            <a:endParaRPr lang="de-DE" sz="1500" b="1" dirty="0">
-              <a:solidFill>
-                <a:schemeClr val="tx1"/>
-              </a:solidFill>
-              <a:latin typeface="Roboto Light" panose="02000000000000000000" pitchFamily="2" charset="0"/>
-              <a:ea typeface="Roboto Light" panose="02000000000000000000" pitchFamily="2" charset="0"/>
-              <a:cs typeface="Roboto Light" panose="02000000000000000000" pitchFamily="2" charset="0"/>
-            </a:endParaRPr>
           </a:p>
         </p:txBody>
       </p:sp>
@@ -9628,14 +9498,6 @@
               </a:rPr>
               <a:t>PV</a:t>
             </a:r>
-            <a:endParaRPr lang="de-DE" sz="1500" b="1" dirty="0">
-              <a:solidFill>
-                <a:schemeClr val="tx1"/>
-              </a:solidFill>
-              <a:latin typeface="Roboto Light" panose="02000000000000000000" pitchFamily="2" charset="0"/>
-              <a:ea typeface="Roboto Light" panose="02000000000000000000" pitchFamily="2" charset="0"/>
-              <a:cs typeface="Roboto Light" panose="02000000000000000000" pitchFamily="2" charset="0"/>
-            </a:endParaRPr>
           </a:p>
         </p:txBody>
       </p:sp>
@@ -9692,14 +9554,6 @@
               </a:rPr>
               <a:t>TRAFO</a:t>
             </a:r>
-            <a:endParaRPr lang="de-DE" sz="1500" b="1" dirty="0">
-              <a:solidFill>
-                <a:schemeClr val="tx1"/>
-              </a:solidFill>
-              <a:latin typeface="Roboto Light" panose="02000000000000000000" pitchFamily="2" charset="0"/>
-              <a:ea typeface="Roboto Light" panose="02000000000000000000" pitchFamily="2" charset="0"/>
-              <a:cs typeface="Roboto Light" panose="02000000000000000000" pitchFamily="2" charset="0"/>
-            </a:endParaRPr>
           </a:p>
         </p:txBody>
       </p:sp>
@@ -9756,14 +9610,6 @@
               </a:rPr>
               <a:t>MARKT</a:t>
             </a:r>
-            <a:endParaRPr lang="de-DE" sz="1500" b="1" dirty="0">
-              <a:solidFill>
-                <a:schemeClr val="tx1"/>
-              </a:solidFill>
-              <a:latin typeface="Roboto Light" panose="02000000000000000000" pitchFamily="2" charset="0"/>
-              <a:ea typeface="Roboto Light" panose="02000000000000000000" pitchFamily="2" charset="0"/>
-              <a:cs typeface="Roboto Light" panose="02000000000000000000" pitchFamily="2" charset="0"/>
-            </a:endParaRPr>
           </a:p>
         </p:txBody>
       </p:sp>
@@ -9820,14 +9666,6 @@
               </a:rPr>
               <a:t>SHORTAGE</a:t>
             </a:r>
-            <a:endParaRPr lang="de-DE" sz="1500" b="1" dirty="0">
-              <a:solidFill>
-                <a:schemeClr val="tx1"/>
-              </a:solidFill>
-              <a:latin typeface="Roboto Light" panose="02000000000000000000" pitchFamily="2" charset="0"/>
-              <a:ea typeface="Roboto Light" panose="02000000000000000000" pitchFamily="2" charset="0"/>
-              <a:cs typeface="Roboto Light" panose="02000000000000000000" pitchFamily="2" charset="0"/>
-            </a:endParaRPr>
           </a:p>
         </p:txBody>
       </p:sp>
@@ -9884,14 +9722,6 @@
               </a:rPr>
               <a:t>ABREGELUNG</a:t>
             </a:r>
-            <a:endParaRPr lang="de-DE" sz="1500" b="1" dirty="0">
-              <a:solidFill>
-                <a:schemeClr val="tx1"/>
-              </a:solidFill>
-              <a:latin typeface="Roboto Light" panose="02000000000000000000" pitchFamily="2" charset="0"/>
-              <a:ea typeface="Roboto Light" panose="02000000000000000000" pitchFamily="2" charset="0"/>
-              <a:cs typeface="Roboto Light" panose="02000000000000000000" pitchFamily="2" charset="0"/>
-            </a:endParaRPr>
           </a:p>
         </p:txBody>
       </p:sp>
@@ -9979,11 +9809,7 @@
             <a:p>
               <a:r>
                 <a:rPr lang="de-DE" sz="2000" dirty="0" err="1"/>
-                <a:t>b</a:t>
-              </a:r>
-              <a:r>
-                <a:rPr lang="de-DE" sz="2000" dirty="0" err="1"/>
-                <a:t>_el</a:t>
+                <a:t>b_el</a:t>
               </a:r>
               <a:endParaRPr lang="de-DE" sz="2000" dirty="0"/>
             </a:p>
@@ -10074,11 +9900,7 @@
             <a:p>
               <a:r>
                 <a:rPr lang="de-DE" sz="2000" dirty="0" err="1"/>
-                <a:t>b</a:t>
-              </a:r>
-              <a:r>
-                <a:rPr lang="de-DE" sz="2000" dirty="0" err="1"/>
-                <a:t>_el</a:t>
+                <a:t>b_el</a:t>
               </a:r>
               <a:endParaRPr lang="de-DE" sz="2000" dirty="0"/>
             </a:p>
@@ -10169,11 +9991,7 @@
             <a:p>
               <a:r>
                 <a:rPr lang="de-DE" sz="2000" dirty="0" err="1"/>
-                <a:t>b</a:t>
-              </a:r>
-              <a:r>
-                <a:rPr lang="de-DE" sz="2000" dirty="0" err="1"/>
-                <a:t>_el</a:t>
+                <a:t>b_el</a:t>
               </a:r>
               <a:endParaRPr lang="de-DE" sz="2000" dirty="0"/>
             </a:p>
@@ -10264,11 +10082,7 @@
             <a:p>
               <a:r>
                 <a:rPr lang="de-DE" sz="2000" dirty="0" err="1"/>
-                <a:t>b</a:t>
-              </a:r>
-              <a:r>
-                <a:rPr lang="de-DE" sz="2000" dirty="0" err="1"/>
-                <a:t>_el</a:t>
+                <a:t>b_el</a:t>
               </a:r>
               <a:endParaRPr lang="de-DE" sz="2000" dirty="0"/>
             </a:p>
@@ -10359,11 +10173,7 @@
             <a:p>
               <a:r>
                 <a:rPr lang="de-DE" sz="2000" dirty="0" err="1"/>
-                <a:t>b</a:t>
-              </a:r>
-              <a:r>
-                <a:rPr lang="de-DE" sz="2000" dirty="0" err="1"/>
-                <a:t>_el</a:t>
+                <a:t>b_el</a:t>
               </a:r>
               <a:endParaRPr lang="de-DE" sz="2000" dirty="0"/>
             </a:p>
@@ -10423,14 +10233,6 @@
               </a:rPr>
               <a:t>WIND</a:t>
             </a:r>
-            <a:endParaRPr lang="de-DE" sz="1500" b="1" dirty="0">
-              <a:solidFill>
-                <a:schemeClr val="tx1"/>
-              </a:solidFill>
-              <a:latin typeface="Roboto Light" panose="02000000000000000000" pitchFamily="2" charset="0"/>
-              <a:ea typeface="Roboto Light" panose="02000000000000000000" pitchFamily="2" charset="0"/>
-              <a:cs typeface="Roboto Light" panose="02000000000000000000" pitchFamily="2" charset="0"/>
-            </a:endParaRPr>
           </a:p>
         </p:txBody>
       </p:sp>
@@ -10487,14 +10289,6 @@
               </a:rPr>
               <a:t>PV</a:t>
             </a:r>
-            <a:endParaRPr lang="de-DE" sz="1500" b="1" dirty="0">
-              <a:solidFill>
-                <a:schemeClr val="tx1"/>
-              </a:solidFill>
-              <a:latin typeface="Roboto Light" panose="02000000000000000000" pitchFamily="2" charset="0"/>
-              <a:ea typeface="Roboto Light" panose="02000000000000000000" pitchFamily="2" charset="0"/>
-              <a:cs typeface="Roboto Light" panose="02000000000000000000" pitchFamily="2" charset="0"/>
-            </a:endParaRPr>
           </a:p>
         </p:txBody>
       </p:sp>
@@ -10551,14 +10345,6 @@
               </a:rPr>
               <a:t>WIND</a:t>
             </a:r>
-            <a:endParaRPr lang="de-DE" sz="1500" b="1" dirty="0">
-              <a:solidFill>
-                <a:schemeClr val="tx1"/>
-              </a:solidFill>
-              <a:latin typeface="Roboto Light" panose="02000000000000000000" pitchFamily="2" charset="0"/>
-              <a:ea typeface="Roboto Light" panose="02000000000000000000" pitchFamily="2" charset="0"/>
-              <a:cs typeface="Roboto Light" panose="02000000000000000000" pitchFamily="2" charset="0"/>
-            </a:endParaRPr>
           </a:p>
         </p:txBody>
       </p:sp>
@@ -10615,14 +10401,6 @@
               </a:rPr>
               <a:t>PV</a:t>
             </a:r>
-            <a:endParaRPr lang="de-DE" sz="1500" b="1" dirty="0">
-              <a:solidFill>
-                <a:schemeClr val="tx1"/>
-              </a:solidFill>
-              <a:latin typeface="Roboto Light" panose="02000000000000000000" pitchFamily="2" charset="0"/>
-              <a:ea typeface="Roboto Light" panose="02000000000000000000" pitchFamily="2" charset="0"/>
-              <a:cs typeface="Roboto Light" panose="02000000000000000000" pitchFamily="2" charset="0"/>
-            </a:endParaRPr>
           </a:p>
         </p:txBody>
       </p:sp>
@@ -10679,14 +10457,6 @@
               </a:rPr>
               <a:t>WIND</a:t>
             </a:r>
-            <a:endParaRPr lang="de-DE" sz="1500" b="1" dirty="0">
-              <a:solidFill>
-                <a:schemeClr val="tx1"/>
-              </a:solidFill>
-              <a:latin typeface="Roboto Light" panose="02000000000000000000" pitchFamily="2" charset="0"/>
-              <a:ea typeface="Roboto Light" panose="02000000000000000000" pitchFamily="2" charset="0"/>
-              <a:cs typeface="Roboto Light" panose="02000000000000000000" pitchFamily="2" charset="0"/>
-            </a:endParaRPr>
           </a:p>
         </p:txBody>
       </p:sp>
@@ -10743,14 +10513,6 @@
               </a:rPr>
               <a:t>PV</a:t>
             </a:r>
-            <a:endParaRPr lang="de-DE" sz="1500" b="1" dirty="0">
-              <a:solidFill>
-                <a:schemeClr val="tx1"/>
-              </a:solidFill>
-              <a:latin typeface="Roboto Light" panose="02000000000000000000" pitchFamily="2" charset="0"/>
-              <a:ea typeface="Roboto Light" panose="02000000000000000000" pitchFamily="2" charset="0"/>
-              <a:cs typeface="Roboto Light" panose="02000000000000000000" pitchFamily="2" charset="0"/>
-            </a:endParaRPr>
           </a:p>
         </p:txBody>
       </p:sp>
@@ -10838,11 +10600,7 @@
             <a:p>
               <a:r>
                 <a:rPr lang="de-DE" sz="2000" dirty="0" err="1"/>
-                <a:t>b</a:t>
-              </a:r>
-              <a:r>
-                <a:rPr lang="de-DE" sz="2000" dirty="0" err="1"/>
-                <a:t>_el</a:t>
+                <a:t>b_el</a:t>
               </a:r>
               <a:endParaRPr lang="de-DE" sz="2000" dirty="0"/>
             </a:p>
@@ -10902,14 +10660,6 @@
               </a:rPr>
               <a:t>TRAFO</a:t>
             </a:r>
-            <a:endParaRPr lang="de-DE" sz="1500" b="1" dirty="0">
-              <a:solidFill>
-                <a:schemeClr val="tx1"/>
-              </a:solidFill>
-              <a:latin typeface="Roboto Light" panose="02000000000000000000" pitchFamily="2" charset="0"/>
-              <a:ea typeface="Roboto Light" panose="02000000000000000000" pitchFamily="2" charset="0"/>
-              <a:cs typeface="Roboto Light" panose="02000000000000000000" pitchFamily="2" charset="0"/>
-            </a:endParaRPr>
           </a:p>
         </p:txBody>
       </p:sp>
@@ -10966,14 +10716,6 @@
               </a:rPr>
               <a:t>TRAFO</a:t>
             </a:r>
-            <a:endParaRPr lang="de-DE" sz="1500" b="1" dirty="0">
-              <a:solidFill>
-                <a:schemeClr val="tx1"/>
-              </a:solidFill>
-              <a:latin typeface="Roboto Light" panose="02000000000000000000" pitchFamily="2" charset="0"/>
-              <a:ea typeface="Roboto Light" panose="02000000000000000000" pitchFamily="2" charset="0"/>
-              <a:cs typeface="Roboto Light" panose="02000000000000000000" pitchFamily="2" charset="0"/>
-            </a:endParaRPr>
           </a:p>
         </p:txBody>
       </p:sp>
@@ -11030,14 +10772,6 @@
               </a:rPr>
               <a:t>TRAFO</a:t>
             </a:r>
-            <a:endParaRPr lang="de-DE" sz="1500" b="1" dirty="0">
-              <a:solidFill>
-                <a:schemeClr val="tx1"/>
-              </a:solidFill>
-              <a:latin typeface="Roboto Light" panose="02000000000000000000" pitchFamily="2" charset="0"/>
-              <a:ea typeface="Roboto Light" panose="02000000000000000000" pitchFamily="2" charset="0"/>
-              <a:cs typeface="Roboto Light" panose="02000000000000000000" pitchFamily="2" charset="0"/>
-            </a:endParaRPr>
           </a:p>
         </p:txBody>
       </p:sp>
@@ -11094,14 +10828,6 @@
               </a:rPr>
               <a:t>TRAFO</a:t>
             </a:r>
-            <a:endParaRPr lang="de-DE" sz="1500" b="1" dirty="0">
-              <a:solidFill>
-                <a:schemeClr val="tx1"/>
-              </a:solidFill>
-              <a:latin typeface="Roboto Light" panose="02000000000000000000" pitchFamily="2" charset="0"/>
-              <a:ea typeface="Roboto Light" panose="02000000000000000000" pitchFamily="2" charset="0"/>
-              <a:cs typeface="Roboto Light" panose="02000000000000000000" pitchFamily="2" charset="0"/>
-            </a:endParaRPr>
           </a:p>
         </p:txBody>
       </p:sp>
@@ -12058,14 +11784,6 @@
               </a:rPr>
               <a:t>ABREGELUNG</a:t>
             </a:r>
-            <a:endParaRPr lang="de-DE" sz="1500" b="1" dirty="0">
-              <a:solidFill>
-                <a:schemeClr val="tx1"/>
-              </a:solidFill>
-              <a:latin typeface="Roboto Light" panose="02000000000000000000" pitchFamily="2" charset="0"/>
-              <a:ea typeface="Roboto Light" panose="02000000000000000000" pitchFamily="2" charset="0"/>
-              <a:cs typeface="Roboto Light" panose="02000000000000000000" pitchFamily="2" charset="0"/>
-            </a:endParaRPr>
           </a:p>
         </p:txBody>
       </p:sp>
@@ -12202,14 +11920,6 @@
               </a:rPr>
               <a:t>SENKE</a:t>
             </a:r>
-            <a:endParaRPr lang="de-DE" sz="1500" b="1" dirty="0">
-              <a:solidFill>
-                <a:schemeClr val="tx1"/>
-              </a:solidFill>
-              <a:latin typeface="Roboto Light" panose="02000000000000000000" pitchFamily="2" charset="0"/>
-              <a:ea typeface="Roboto Light" panose="02000000000000000000" pitchFamily="2" charset="0"/>
-              <a:cs typeface="Roboto Light" panose="02000000000000000000" pitchFamily="2" charset="0"/>
-            </a:endParaRPr>
           </a:p>
         </p:txBody>
       </p:sp>
@@ -12266,14 +11976,6 @@
               </a:rPr>
               <a:t>QUELLE</a:t>
             </a:r>
-            <a:endParaRPr lang="de-DE" sz="1400" b="1" dirty="0">
-              <a:solidFill>
-                <a:schemeClr val="tx1"/>
-              </a:solidFill>
-              <a:latin typeface="Roboto Light" panose="02000000000000000000" pitchFamily="2" charset="0"/>
-              <a:ea typeface="Roboto Light" panose="02000000000000000000" pitchFamily="2" charset="0"/>
-              <a:cs typeface="Roboto Light" panose="02000000000000000000" pitchFamily="2" charset="0"/>
-            </a:endParaRPr>
           </a:p>
         </p:txBody>
       </p:sp>
@@ -12330,14 +12032,6 @@
               </a:rPr>
               <a:t>QUELLE</a:t>
             </a:r>
-            <a:endParaRPr lang="de-DE" sz="1400" b="1" dirty="0">
-              <a:solidFill>
-                <a:schemeClr val="tx1"/>
-              </a:solidFill>
-              <a:latin typeface="Roboto Light" panose="02000000000000000000" pitchFamily="2" charset="0"/>
-              <a:ea typeface="Roboto Light" panose="02000000000000000000" pitchFamily="2" charset="0"/>
-              <a:cs typeface="Roboto Light" panose="02000000000000000000" pitchFamily="2" charset="0"/>
-            </a:endParaRPr>
           </a:p>
         </p:txBody>
       </p:sp>
@@ -12394,14 +12088,6 @@
               </a:rPr>
               <a:t>QUELLE</a:t>
             </a:r>
-            <a:endParaRPr lang="de-DE" sz="1400" b="1" dirty="0">
-              <a:solidFill>
-                <a:schemeClr val="tx1"/>
-              </a:solidFill>
-              <a:latin typeface="Roboto Light" panose="02000000000000000000" pitchFamily="2" charset="0"/>
-              <a:ea typeface="Roboto Light" panose="02000000000000000000" pitchFamily="2" charset="0"/>
-              <a:cs typeface="Roboto Light" panose="02000000000000000000" pitchFamily="2" charset="0"/>
-            </a:endParaRPr>
           </a:p>
         </p:txBody>
       </p:sp>
@@ -12458,14 +12144,6 @@
               </a:rPr>
               <a:t>TRAFO</a:t>
             </a:r>
-            <a:endParaRPr lang="de-DE" sz="1500" b="1" dirty="0">
-              <a:solidFill>
-                <a:schemeClr val="tx1"/>
-              </a:solidFill>
-              <a:latin typeface="Roboto Light" panose="02000000000000000000" pitchFamily="2" charset="0"/>
-              <a:ea typeface="Roboto Light" panose="02000000000000000000" pitchFamily="2" charset="0"/>
-              <a:cs typeface="Roboto Light" panose="02000000000000000000" pitchFamily="2" charset="0"/>
-            </a:endParaRPr>
           </a:p>
         </p:txBody>
       </p:sp>
@@ -12515,11 +12193,6 @@
               </a:rPr>
               <a:t>)</a:t>
             </a:r>
-            <a:endParaRPr lang="de-DE" sz="1400" dirty="0">
-              <a:latin typeface="Roboto Light" panose="02000000000000000000" pitchFamily="2" charset="0"/>
-              <a:ea typeface="Roboto Light" panose="02000000000000000000" pitchFamily="2" charset="0"/>
-              <a:cs typeface="Roboto Light" panose="02000000000000000000" pitchFamily="2" charset="0"/>
-            </a:endParaRPr>
           </a:p>
         </p:txBody>
       </p:sp>
@@ -12569,11 +12242,6 @@
               </a:rPr>
               <a:t>)</a:t>
             </a:r>
-            <a:endParaRPr lang="de-DE" sz="1400" dirty="0">
-              <a:latin typeface="Roboto Light" panose="02000000000000000000" pitchFamily="2" charset="0"/>
-              <a:ea typeface="Roboto Light" panose="02000000000000000000" pitchFamily="2" charset="0"/>
-              <a:cs typeface="Roboto Light" panose="02000000000000000000" pitchFamily="2" charset="0"/>
-            </a:endParaRPr>
           </a:p>
         </p:txBody>
       </p:sp>
@@ -12633,14 +12301,6 @@
               </a:rPr>
               <a:t>BAT</a:t>
             </a:r>
-            <a:endParaRPr lang="de-DE" sz="1500" b="1" dirty="0">
-              <a:solidFill>
-                <a:schemeClr val="tx1"/>
-              </a:solidFill>
-              <a:latin typeface="Roboto Light" panose="02000000000000000000" pitchFamily="2" charset="0"/>
-              <a:ea typeface="Roboto Light" panose="02000000000000000000" pitchFamily="2" charset="0"/>
-              <a:cs typeface="Roboto Light" panose="02000000000000000000" pitchFamily="2" charset="0"/>
-            </a:endParaRPr>
           </a:p>
         </p:txBody>
       </p:sp>
@@ -12700,14 +12360,6 @@
               </a:rPr>
               <a:t>BAT</a:t>
             </a:r>
-            <a:endParaRPr lang="de-DE" sz="1500" b="1" dirty="0">
-              <a:solidFill>
-                <a:schemeClr val="tx1"/>
-              </a:solidFill>
-              <a:latin typeface="Roboto Light" panose="02000000000000000000" pitchFamily="2" charset="0"/>
-              <a:ea typeface="Roboto Light" panose="02000000000000000000" pitchFamily="2" charset="0"/>
-              <a:cs typeface="Roboto Light" panose="02000000000000000000" pitchFamily="2" charset="0"/>
-            </a:endParaRPr>
           </a:p>
         </p:txBody>
       </p:sp>
@@ -12842,14 +12494,6 @@
               </a:rPr>
               <a:t>VBKW</a:t>
             </a:r>
-            <a:endParaRPr lang="de-DE" sz="1500" b="1" dirty="0">
-              <a:solidFill>
-                <a:schemeClr val="bg1"/>
-              </a:solidFill>
-              <a:latin typeface="Roboto Light" panose="02000000000000000000" pitchFamily="2" charset="0"/>
-              <a:ea typeface="Roboto Light" panose="02000000000000000000" pitchFamily="2" charset="0"/>
-              <a:cs typeface="Roboto Light" panose="02000000000000000000" pitchFamily="2" charset="0"/>
-            </a:endParaRPr>
           </a:p>
         </p:txBody>
       </p:sp>

</xml_diff>

<commit_message>
Errased the sobol analysis in sensitivity_analysis.py
</commit_message>
<xml_diff>
--- a/windnode_kwum/docs/Modell_KWUM.pptx
+++ b/windnode_kwum/docs/Modell_KWUM.pptx
@@ -194,7 +194,7 @@
           <a:p>
             <a:fld id="{FFAFB158-CE29-D640-AF46-24D22F3973B1}" type="datetimeFigureOut">
               <a:rPr lang="en-US" smtClean="0"/>
-              <a:t>9/12/18</a:t>
+              <a:t>10/29/18</a:t>
             </a:fld>
             <a:endParaRPr lang="en-US"/>
           </a:p>
@@ -727,7 +727,7 @@
           <a:p>
             <a:fld id="{26D4ED77-5BAD-4853-9D32-3E8CE03B9A25}" type="datetimeFigureOut">
               <a:rPr lang="de-DE" smtClean="0"/>
-              <a:t>9/12/18</a:t>
+              <a:t>10/29/18</a:t>
             </a:fld>
             <a:endParaRPr lang="de-DE"/>
           </a:p>
@@ -897,7 +897,7 @@
           <a:p>
             <a:fld id="{26D4ED77-5BAD-4853-9D32-3E8CE03B9A25}" type="datetimeFigureOut">
               <a:rPr lang="de-DE" smtClean="0"/>
-              <a:t>9/12/18</a:t>
+              <a:t>10/29/18</a:t>
             </a:fld>
             <a:endParaRPr lang="de-DE"/>
           </a:p>
@@ -1077,7 +1077,7 @@
           <a:p>
             <a:fld id="{26D4ED77-5BAD-4853-9D32-3E8CE03B9A25}" type="datetimeFigureOut">
               <a:rPr lang="de-DE" smtClean="0"/>
-              <a:t>9/12/18</a:t>
+              <a:t>10/29/18</a:t>
             </a:fld>
             <a:endParaRPr lang="de-DE"/>
           </a:p>
@@ -1247,7 +1247,7 @@
           <a:p>
             <a:fld id="{26D4ED77-5BAD-4853-9D32-3E8CE03B9A25}" type="datetimeFigureOut">
               <a:rPr lang="de-DE" smtClean="0"/>
-              <a:t>9/12/18</a:t>
+              <a:t>10/29/18</a:t>
             </a:fld>
             <a:endParaRPr lang="de-DE"/>
           </a:p>
@@ -1493,7 +1493,7 @@
           <a:p>
             <a:fld id="{26D4ED77-5BAD-4853-9D32-3E8CE03B9A25}" type="datetimeFigureOut">
               <a:rPr lang="de-DE" smtClean="0"/>
-              <a:t>9/12/18</a:t>
+              <a:t>10/29/18</a:t>
             </a:fld>
             <a:endParaRPr lang="de-DE"/>
           </a:p>
@@ -1781,7 +1781,7 @@
           <a:p>
             <a:fld id="{26D4ED77-5BAD-4853-9D32-3E8CE03B9A25}" type="datetimeFigureOut">
               <a:rPr lang="de-DE" smtClean="0"/>
-              <a:t>9/12/18</a:t>
+              <a:t>10/29/18</a:t>
             </a:fld>
             <a:endParaRPr lang="de-DE"/>
           </a:p>
@@ -2208,7 +2208,7 @@
           <a:p>
             <a:fld id="{26D4ED77-5BAD-4853-9D32-3E8CE03B9A25}" type="datetimeFigureOut">
               <a:rPr lang="de-DE" smtClean="0"/>
-              <a:t>9/12/18</a:t>
+              <a:t>10/29/18</a:t>
             </a:fld>
             <a:endParaRPr lang="de-DE"/>
           </a:p>
@@ -2326,7 +2326,7 @@
           <a:p>
             <a:fld id="{26D4ED77-5BAD-4853-9D32-3E8CE03B9A25}" type="datetimeFigureOut">
               <a:rPr lang="de-DE" smtClean="0"/>
-              <a:t>9/12/18</a:t>
+              <a:t>10/29/18</a:t>
             </a:fld>
             <a:endParaRPr lang="de-DE"/>
           </a:p>
@@ -2421,7 +2421,7 @@
           <a:p>
             <a:fld id="{26D4ED77-5BAD-4853-9D32-3E8CE03B9A25}" type="datetimeFigureOut">
               <a:rPr lang="de-DE" smtClean="0"/>
-              <a:t>9/12/18</a:t>
+              <a:t>10/29/18</a:t>
             </a:fld>
             <a:endParaRPr lang="de-DE"/>
           </a:p>
@@ -2698,7 +2698,7 @@
           <a:p>
             <a:fld id="{26D4ED77-5BAD-4853-9D32-3E8CE03B9A25}" type="datetimeFigureOut">
               <a:rPr lang="de-DE" smtClean="0"/>
-              <a:t>9/12/18</a:t>
+              <a:t>10/29/18</a:t>
             </a:fld>
             <a:endParaRPr lang="de-DE"/>
           </a:p>
@@ -2951,7 +2951,7 @@
           <a:p>
             <a:fld id="{26D4ED77-5BAD-4853-9D32-3E8CE03B9A25}" type="datetimeFigureOut">
               <a:rPr lang="de-DE" smtClean="0"/>
-              <a:t>9/12/18</a:t>
+              <a:t>10/29/18</a:t>
             </a:fld>
             <a:endParaRPr lang="de-DE"/>
           </a:p>
@@ -3164,7 +3164,7 @@
           <a:p>
             <a:fld id="{26D4ED77-5BAD-4853-9D32-3E8CE03B9A25}" type="datetimeFigureOut">
               <a:rPr lang="de-DE" smtClean="0"/>
-              <a:t>9/12/18</a:t>
+              <a:t>10/29/18</a:t>
             </a:fld>
             <a:endParaRPr lang="de-DE"/>
           </a:p>
@@ -3547,10 +3547,10 @@
         </p:nvGrpSpPr>
         <p:grpSpPr>
           <a:xfrm>
-            <a:off x="0" y="192088"/>
-            <a:ext cx="12751906" cy="9073008"/>
-            <a:chOff x="0" y="-85355"/>
-            <a:chExt cx="9108504" cy="6480720"/>
+            <a:off x="120497" y="635325"/>
+            <a:ext cx="12631409" cy="8629771"/>
+            <a:chOff x="86069" y="231243"/>
+            <a:chExt cx="9022435" cy="6164122"/>
           </a:xfrm>
         </p:grpSpPr>
         <p:cxnSp>
@@ -4057,58 +4057,6 @@
             </a:p>
           </p:txBody>
         </p:sp>
-        <p:sp>
-          <p:nvSpPr>
-            <p:cNvPr id="74" name="Rechteck 73"/>
-            <p:cNvSpPr/>
-            <p:nvPr/>
-          </p:nvSpPr>
-          <p:spPr>
-            <a:xfrm>
-              <a:off x="3720199" y="6021750"/>
-              <a:ext cx="864000" cy="360000"/>
-            </a:xfrm>
-            <a:prstGeom prst="rect">
-              <a:avLst/>
-            </a:prstGeom>
-            <a:solidFill>
-              <a:srgbClr val="FFC000">
-                <a:alpha val="35000"/>
-              </a:srgbClr>
-            </a:solidFill>
-            <a:ln>
-              <a:noFill/>
-            </a:ln>
-          </p:spPr>
-          <p:style>
-            <a:lnRef idx="2">
-              <a:schemeClr val="accent1">
-                <a:shade val="50000"/>
-              </a:schemeClr>
-            </a:lnRef>
-            <a:fillRef idx="1">
-              <a:schemeClr val="accent1"/>
-            </a:fillRef>
-            <a:effectRef idx="0">
-              <a:schemeClr val="accent1"/>
-            </a:effectRef>
-            <a:fontRef idx="minor">
-              <a:schemeClr val="lt1"/>
-            </a:fontRef>
-          </p:style>
-          <p:txBody>
-            <a:bodyPr rtlCol="0" anchor="ctr"/>
-            <a:lstStyle/>
-            <a:p>
-              <a:pPr algn="ctr"/>
-              <a:r>
-                <a:rPr lang="de-DE" sz="1400" dirty="0" err="1"/>
-                <a:t>Shortage_sch</a:t>
-              </a:r>
-              <a:endParaRPr lang="de-DE" sz="1400" dirty="0"/>
-            </a:p>
-          </p:txBody>
-        </p:sp>
         <p:cxnSp>
           <p:nvCxnSpPr>
             <p:cNvPr id="78" name="Gerade Verbindung mit Pfeil 77"/>
@@ -4189,46 +4137,6 @@
         </p:cxnSp>
         <p:cxnSp>
           <p:nvCxnSpPr>
-            <p:cNvPr id="84" name="Gerade Verbindung mit Pfeil 83"/>
-            <p:cNvCxnSpPr>
-              <a:stCxn id="74" idx="3"/>
-              <a:endCxn id="70" idx="3"/>
-            </p:cNvCxnSpPr>
-            <p:nvPr/>
-          </p:nvCxnSpPr>
-          <p:spPr>
-            <a:xfrm flipV="1">
-              <a:off x="4584199" y="5440852"/>
-              <a:ext cx="1002936" cy="760898"/>
-            </a:xfrm>
-            <a:prstGeom prst="straightConnector1">
-              <a:avLst/>
-            </a:prstGeom>
-            <a:ln w="12700">
-              <a:solidFill>
-                <a:schemeClr val="tx1"/>
-              </a:solidFill>
-              <a:prstDash val="lgDash"/>
-              <a:tailEnd type="arrow"/>
-            </a:ln>
-          </p:spPr>
-          <p:style>
-            <a:lnRef idx="1">
-              <a:schemeClr val="accent1"/>
-            </a:lnRef>
-            <a:fillRef idx="0">
-              <a:schemeClr val="accent1"/>
-            </a:fillRef>
-            <a:effectRef idx="0">
-              <a:schemeClr val="accent1"/>
-            </a:effectRef>
-            <a:fontRef idx="minor">
-              <a:schemeClr val="tx1"/>
-            </a:fontRef>
-          </p:style>
-        </p:cxnSp>
-        <p:cxnSp>
-          <p:nvCxnSpPr>
             <p:cNvPr id="87" name="Gerade Verbindung mit Pfeil 86"/>
             <p:cNvCxnSpPr>
               <a:stCxn id="70" idx="6"/>
@@ -4248,98 +4156,6 @@
               <a:solidFill>
                 <a:schemeClr val="tx1"/>
               </a:solidFill>
-              <a:tailEnd type="arrow"/>
-            </a:ln>
-          </p:spPr>
-          <p:style>
-            <a:lnRef idx="1">
-              <a:schemeClr val="accent1"/>
-            </a:lnRef>
-            <a:fillRef idx="0">
-              <a:schemeClr val="accent1"/>
-            </a:fillRef>
-            <a:effectRef idx="0">
-              <a:schemeClr val="accent1"/>
-            </a:effectRef>
-            <a:fontRef idx="minor">
-              <a:schemeClr val="tx1"/>
-            </a:fontRef>
-          </p:style>
-        </p:cxnSp>
-        <p:sp>
-          <p:nvSpPr>
-            <p:cNvPr id="58" name="Rechteck 57"/>
-            <p:cNvSpPr/>
-            <p:nvPr/>
-          </p:nvSpPr>
-          <p:spPr>
-            <a:xfrm>
-              <a:off x="86069" y="3933056"/>
-              <a:ext cx="864000" cy="360000"/>
-            </a:xfrm>
-            <a:prstGeom prst="rect">
-              <a:avLst/>
-            </a:prstGeom>
-            <a:solidFill>
-              <a:schemeClr val="accent3">
-                <a:alpha val="35000"/>
-              </a:schemeClr>
-            </a:solidFill>
-            <a:ln>
-              <a:noFill/>
-            </a:ln>
-          </p:spPr>
-          <p:style>
-            <a:lnRef idx="2">
-              <a:schemeClr val="accent1">
-                <a:shade val="50000"/>
-              </a:schemeClr>
-            </a:lnRef>
-            <a:fillRef idx="1">
-              <a:schemeClr val="accent1"/>
-            </a:fillRef>
-            <a:effectRef idx="0">
-              <a:schemeClr val="accent1"/>
-            </a:effectRef>
-            <a:fontRef idx="minor">
-              <a:schemeClr val="lt1"/>
-            </a:fontRef>
-          </p:style>
-          <p:txBody>
-            <a:bodyPr rtlCol="0" anchor="ctr"/>
-            <a:lstStyle/>
-            <a:p>
-              <a:pPr algn="ctr"/>
-              <a:r>
-                <a:rPr lang="de-DE" sz="1400" dirty="0" err="1"/>
-                <a:t>excess</a:t>
-              </a:r>
-              <a:endParaRPr lang="de-DE" sz="1400" dirty="0"/>
-            </a:p>
-          </p:txBody>
-        </p:sp>
-        <p:cxnSp>
-          <p:nvCxnSpPr>
-            <p:cNvPr id="60" name="Gerade Verbindung mit Pfeil 59"/>
-            <p:cNvCxnSpPr>
-              <a:stCxn id="4" idx="3"/>
-              <a:endCxn id="58" idx="3"/>
-            </p:cNvCxnSpPr>
-            <p:nvPr/>
-          </p:nvCxnSpPr>
-          <p:spPr>
-            <a:xfrm flipH="1">
-              <a:off x="950069" y="3567293"/>
-              <a:ext cx="880451" cy="545763"/>
-            </a:xfrm>
-            <a:prstGeom prst="straightConnector1">
-              <a:avLst/>
-            </a:prstGeom>
-            <a:ln w="19050">
-              <a:solidFill>
-                <a:schemeClr val="tx1"/>
-              </a:solidFill>
-              <a:prstDash val="lgDash"/>
               <a:tailEnd type="arrow"/>
             </a:ln>
           </p:spPr>
@@ -4599,61 +4415,6 @@
             </a:p>
           </p:txBody>
         </p:sp>
-        <p:sp>
-          <p:nvSpPr>
-            <p:cNvPr id="112" name="Rechteck 111"/>
-            <p:cNvSpPr/>
-            <p:nvPr/>
-          </p:nvSpPr>
-          <p:spPr>
-            <a:xfrm>
-              <a:off x="3539153" y="231243"/>
-              <a:ext cx="864000" cy="360000"/>
-            </a:xfrm>
-            <a:prstGeom prst="rect">
-              <a:avLst/>
-            </a:prstGeom>
-            <a:solidFill>
-              <a:srgbClr val="FFC000">
-                <a:alpha val="35000"/>
-              </a:srgbClr>
-            </a:solidFill>
-            <a:ln>
-              <a:noFill/>
-            </a:ln>
-          </p:spPr>
-          <p:style>
-            <a:lnRef idx="2">
-              <a:schemeClr val="accent1">
-                <a:shade val="50000"/>
-              </a:schemeClr>
-            </a:lnRef>
-            <a:fillRef idx="1">
-              <a:schemeClr val="accent1"/>
-            </a:fillRef>
-            <a:effectRef idx="0">
-              <a:schemeClr val="accent1"/>
-            </a:effectRef>
-            <a:fontRef idx="minor">
-              <a:schemeClr val="lt1"/>
-            </a:fontRef>
-          </p:style>
-          <p:txBody>
-            <a:bodyPr rtlCol="0" anchor="ctr"/>
-            <a:lstStyle/>
-            <a:p>
-              <a:pPr algn="ctr"/>
-              <a:r>
-                <a:rPr lang="de-DE" sz="1400" dirty="0" err="1"/>
-                <a:t>Shortage_pr</a:t>
-              </a:r>
-              <a:r>
-                <a:rPr lang="de-DE" sz="1400" dirty="0"/>
-                <a:t> </a:t>
-              </a:r>
-            </a:p>
-          </p:txBody>
-        </p:sp>
         <p:cxnSp>
           <p:nvCxnSpPr>
             <p:cNvPr id="113" name="Gerade Verbindung mit Pfeil 112"/>
@@ -4675,45 +4436,6 @@
               <a:solidFill>
                 <a:schemeClr val="tx1"/>
               </a:solidFill>
-              <a:tailEnd type="arrow"/>
-            </a:ln>
-          </p:spPr>
-          <p:style>
-            <a:lnRef idx="1">
-              <a:schemeClr val="accent1"/>
-            </a:lnRef>
-            <a:fillRef idx="0">
-              <a:schemeClr val="accent1"/>
-            </a:fillRef>
-            <a:effectRef idx="0">
-              <a:schemeClr val="accent1"/>
-            </a:effectRef>
-            <a:fontRef idx="minor">
-              <a:schemeClr val="tx1"/>
-            </a:fontRef>
-          </p:style>
-        </p:cxnSp>
-        <p:cxnSp>
-          <p:nvCxnSpPr>
-            <p:cNvPr id="114" name="Gerade Verbindung mit Pfeil 113"/>
-            <p:cNvCxnSpPr>
-              <a:stCxn id="112" idx="3"/>
-            </p:cNvCxnSpPr>
-            <p:nvPr/>
-          </p:nvCxnSpPr>
-          <p:spPr>
-            <a:xfrm>
-              <a:off x="4403153" y="411243"/>
-              <a:ext cx="1443159" cy="741076"/>
-            </a:xfrm>
-            <a:prstGeom prst="straightConnector1">
-              <a:avLst/>
-            </a:prstGeom>
-            <a:ln w="12700">
-              <a:solidFill>
-                <a:schemeClr val="tx1"/>
-              </a:solidFill>
-              <a:prstDash val="lgDash"/>
               <a:tailEnd type="arrow"/>
             </a:ln>
           </p:spPr>
@@ -5323,8 +5045,8 @@
             <a:p>
               <a:pPr algn="ctr"/>
               <a:r>
-                <a:rPr lang="de-DE" sz="1700" dirty="0" err="1"/>
-                <a:t>Bus_surplus</a:t>
+                <a:rPr lang="de-DE" sz="1700" dirty="0" err="1" smtClean="0"/>
+                <a:t>Bus_flex</a:t>
               </a:r>
               <a:endParaRPr lang="de-DE" sz="1700" dirty="0"/>
             </a:p>
@@ -5454,282 +5176,6 @@
             </a:p>
           </p:txBody>
         </p:sp>
-        <p:sp>
-          <p:nvSpPr>
-            <p:cNvPr id="63" name="Rechteck 5"/>
-            <p:cNvSpPr/>
-            <p:nvPr/>
-          </p:nvSpPr>
-          <p:spPr>
-            <a:xfrm>
-              <a:off x="86069" y="3232632"/>
-              <a:ext cx="864000" cy="360000"/>
-            </a:xfrm>
-            <a:prstGeom prst="rect">
-              <a:avLst/>
-            </a:prstGeom>
-            <a:solidFill>
-              <a:srgbClr val="FFC000">
-                <a:alpha val="40000"/>
-              </a:srgbClr>
-            </a:solidFill>
-            <a:ln>
-              <a:noFill/>
-            </a:ln>
-          </p:spPr>
-          <p:style>
-            <a:lnRef idx="2">
-              <a:schemeClr val="accent1">
-                <a:shade val="50000"/>
-              </a:schemeClr>
-            </a:lnRef>
-            <a:fillRef idx="1">
-              <a:schemeClr val="accent1"/>
-            </a:fillRef>
-            <a:effectRef idx="0">
-              <a:schemeClr val="accent1"/>
-            </a:effectRef>
-            <a:fontRef idx="minor">
-              <a:schemeClr val="lt1"/>
-            </a:fontRef>
-          </p:style>
-          <p:txBody>
-            <a:bodyPr rtlCol="0" anchor="ctr"/>
-            <a:lstStyle/>
-            <a:p>
-              <a:pPr algn="ctr"/>
-              <a:r>
-                <a:rPr lang="de-DE" sz="1400" dirty="0" err="1"/>
-                <a:t>Shortage_el</a:t>
-              </a:r>
-              <a:endParaRPr lang="de-DE" sz="1400" dirty="0"/>
-            </a:p>
-          </p:txBody>
-        </p:sp>
-        <p:cxnSp>
-          <p:nvCxnSpPr>
-            <p:cNvPr id="64" name="Gerade Verbindung mit Pfeil 16"/>
-            <p:cNvCxnSpPr>
-              <a:stCxn id="63" idx="3"/>
-              <a:endCxn id="4" idx="2"/>
-            </p:cNvCxnSpPr>
-            <p:nvPr/>
-          </p:nvCxnSpPr>
-          <p:spPr>
-            <a:xfrm>
-              <a:off x="950069" y="3412632"/>
-              <a:ext cx="738105" cy="27382"/>
-            </a:xfrm>
-            <a:prstGeom prst="straightConnector1">
-              <a:avLst/>
-            </a:prstGeom>
-            <a:ln w="19050">
-              <a:solidFill>
-                <a:schemeClr val="tx1"/>
-              </a:solidFill>
-              <a:prstDash val="dash"/>
-              <a:tailEnd type="arrow"/>
-            </a:ln>
-          </p:spPr>
-          <p:style>
-            <a:lnRef idx="1">
-              <a:schemeClr val="accent1"/>
-            </a:lnRef>
-            <a:fillRef idx="0">
-              <a:schemeClr val="accent1"/>
-            </a:fillRef>
-            <a:effectRef idx="0">
-              <a:schemeClr val="accent1"/>
-            </a:effectRef>
-            <a:fontRef idx="minor">
-              <a:schemeClr val="tx1"/>
-            </a:fontRef>
-          </p:style>
-        </p:cxnSp>
-        <p:sp>
-          <p:nvSpPr>
-            <p:cNvPr id="89" name="Rechteck 57"/>
-            <p:cNvSpPr/>
-            <p:nvPr/>
-          </p:nvSpPr>
-          <p:spPr>
-            <a:xfrm>
-              <a:off x="6566386" y="231243"/>
-              <a:ext cx="864000" cy="360000"/>
-            </a:xfrm>
-            <a:prstGeom prst="rect">
-              <a:avLst/>
-            </a:prstGeom>
-            <a:solidFill>
-              <a:schemeClr val="accent3">
-                <a:alpha val="35000"/>
-              </a:schemeClr>
-            </a:solidFill>
-            <a:ln>
-              <a:noFill/>
-            </a:ln>
-          </p:spPr>
-          <p:style>
-            <a:lnRef idx="2">
-              <a:schemeClr val="accent1">
-                <a:shade val="50000"/>
-              </a:schemeClr>
-            </a:lnRef>
-            <a:fillRef idx="1">
-              <a:schemeClr val="accent1"/>
-            </a:fillRef>
-            <a:effectRef idx="0">
-              <a:schemeClr val="accent1"/>
-            </a:effectRef>
-            <a:fontRef idx="minor">
-              <a:schemeClr val="lt1"/>
-            </a:fontRef>
-          </p:style>
-          <p:txBody>
-            <a:bodyPr rtlCol="0" anchor="ctr"/>
-            <a:lstStyle/>
-            <a:p>
-              <a:pPr algn="ctr"/>
-              <a:r>
-                <a:rPr lang="de-DE" sz="1400" dirty="0" err="1"/>
-                <a:t>excess</a:t>
-              </a:r>
-              <a:endParaRPr lang="de-DE" sz="1400" dirty="0"/>
-            </a:p>
-          </p:txBody>
-        </p:sp>
-        <p:cxnSp>
-          <p:nvCxnSpPr>
-            <p:cNvPr id="90" name="Gerade Verbindung mit Pfeil 112"/>
-            <p:cNvCxnSpPr>
-              <a:stCxn id="109" idx="7"/>
-              <a:endCxn id="89" idx="2"/>
-            </p:cNvCxnSpPr>
-            <p:nvPr/>
-          </p:nvCxnSpPr>
-          <p:spPr>
-            <a:xfrm flipV="1">
-              <a:off x="6264233" y="591243"/>
-              <a:ext cx="734153" cy="613797"/>
-            </a:xfrm>
-            <a:prstGeom prst="straightConnector1">
-              <a:avLst/>
-            </a:prstGeom>
-            <a:ln w="12700">
-              <a:solidFill>
-                <a:schemeClr val="tx1"/>
-              </a:solidFill>
-              <a:prstDash val="lgDash"/>
-              <a:tailEnd type="arrow"/>
-            </a:ln>
-          </p:spPr>
-          <p:style>
-            <a:lnRef idx="1">
-              <a:schemeClr val="accent1"/>
-            </a:lnRef>
-            <a:fillRef idx="0">
-              <a:schemeClr val="accent1"/>
-            </a:fillRef>
-            <a:effectRef idx="0">
-              <a:schemeClr val="accent1"/>
-            </a:effectRef>
-            <a:fontRef idx="minor">
-              <a:schemeClr val="tx1"/>
-            </a:fontRef>
-          </p:style>
-        </p:cxnSp>
-        <p:sp>
-          <p:nvSpPr>
-            <p:cNvPr id="91" name="Rechteck 57"/>
-            <p:cNvSpPr/>
-            <p:nvPr/>
-          </p:nvSpPr>
-          <p:spPr>
-            <a:xfrm>
-              <a:off x="6588349" y="6021288"/>
-              <a:ext cx="864000" cy="360000"/>
-            </a:xfrm>
-            <a:prstGeom prst="rect">
-              <a:avLst/>
-            </a:prstGeom>
-            <a:solidFill>
-              <a:schemeClr val="accent3">
-                <a:alpha val="35000"/>
-              </a:schemeClr>
-            </a:solidFill>
-            <a:ln>
-              <a:noFill/>
-            </a:ln>
-          </p:spPr>
-          <p:style>
-            <a:lnRef idx="2">
-              <a:schemeClr val="accent1">
-                <a:shade val="50000"/>
-              </a:schemeClr>
-            </a:lnRef>
-            <a:fillRef idx="1">
-              <a:schemeClr val="accent1"/>
-            </a:fillRef>
-            <a:effectRef idx="0">
-              <a:schemeClr val="accent1"/>
-            </a:effectRef>
-            <a:fontRef idx="minor">
-              <a:schemeClr val="lt1"/>
-            </a:fontRef>
-          </p:style>
-          <p:txBody>
-            <a:bodyPr rtlCol="0" anchor="ctr"/>
-            <a:lstStyle/>
-            <a:p>
-              <a:pPr algn="ctr"/>
-              <a:r>
-                <a:rPr lang="de-DE" sz="1400" dirty="0" err="1"/>
-                <a:t>excess</a:t>
-              </a:r>
-              <a:endParaRPr lang="de-DE" sz="1400" dirty="0"/>
-            </a:p>
-          </p:txBody>
-        </p:sp>
-        <p:cxnSp>
-          <p:nvCxnSpPr>
-            <p:cNvPr id="92" name="Gerade Verbindung mit Pfeil 112"/>
-            <p:cNvCxnSpPr>
-              <a:stCxn id="70" idx="5"/>
-              <a:endCxn id="91" idx="0"/>
-            </p:cNvCxnSpPr>
-            <p:nvPr/>
-          </p:nvCxnSpPr>
-          <p:spPr>
-            <a:xfrm>
-              <a:off x="6274443" y="5440852"/>
-              <a:ext cx="745906" cy="580436"/>
-            </a:xfrm>
-            <a:prstGeom prst="straightConnector1">
-              <a:avLst/>
-            </a:prstGeom>
-            <a:ln w="12700">
-              <a:solidFill>
-                <a:schemeClr val="tx1"/>
-              </a:solidFill>
-              <a:prstDash val="lgDash"/>
-              <a:tailEnd type="arrow"/>
-            </a:ln>
-          </p:spPr>
-          <p:style>
-            <a:lnRef idx="1">
-              <a:schemeClr val="accent1"/>
-            </a:lnRef>
-            <a:fillRef idx="0">
-              <a:schemeClr val="accent1"/>
-            </a:fillRef>
-            <a:effectRef idx="0">
-              <a:schemeClr val="accent1"/>
-            </a:effectRef>
-            <a:fontRef idx="minor">
-              <a:schemeClr val="tx1"/>
-            </a:fontRef>
-          </p:style>
-        </p:cxnSp>
         <p:sp>
           <p:nvSpPr>
             <p:cNvPr id="93" name="Rechteck 5"/>
@@ -6244,56 +5690,6 @@
             </a:fontRef>
           </p:style>
         </p:cxnSp>
-        <p:sp>
-          <p:nvSpPr>
-            <p:cNvPr id="3" name="Rectangle 2"/>
-            <p:cNvSpPr/>
-            <p:nvPr/>
-          </p:nvSpPr>
-          <p:spPr>
-            <a:xfrm>
-              <a:off x="0" y="-85355"/>
-              <a:ext cx="1781013" cy="366073"/>
-            </a:xfrm>
-            <a:prstGeom prst="rect">
-              <a:avLst/>
-            </a:prstGeom>
-          </p:spPr>
-          <p:style>
-            <a:lnRef idx="1">
-              <a:schemeClr val="accent1"/>
-            </a:lnRef>
-            <a:fillRef idx="3">
-              <a:schemeClr val="accent1"/>
-            </a:fillRef>
-            <a:effectRef idx="2">
-              <a:schemeClr val="accent1"/>
-            </a:effectRef>
-            <a:fontRef idx="minor">
-              <a:schemeClr val="lt1"/>
-            </a:fontRef>
-          </p:style>
-          <p:txBody>
-            <a:bodyPr rtlCol="0" anchor="ctr"/>
-            <a:lstStyle/>
-            <a:p>
-              <a:pPr algn="ctr"/>
-              <a:r>
-                <a:rPr lang="en-US" dirty="0" smtClean="0"/>
-                <a:t>12 SEP</a:t>
-              </a:r>
-              <a:r>
-                <a:rPr lang="en-US" dirty="0" smtClean="0"/>
-                <a:t> </a:t>
-              </a:r>
-              <a:r>
-                <a:rPr lang="en-US" dirty="0" smtClean="0"/>
-                <a:t>2018</a:t>
-              </a:r>
-              <a:endParaRPr lang="en-US" dirty="0"/>
-            </a:p>
-          </p:txBody>
-        </p:sp>
         <p:sp>
           <p:nvSpPr>
             <p:cNvPr id="75" name="Ellipse 53"/>

</xml_diff>